<commit_message>
Analysed pre-deduplication index and img produced
</commit_message>
<xml_diff>
--- a/OutGW2day-month-week.pptx
+++ b/OutGW2day-month-week.pptx
@@ -134,6 +134,9 @@
         </p14:section>
       </p14:sectionLst>
     </p:ext>
+    <p:ext uri="{EFAFB233-063F-42B5-8137-9DF3F51BA10A}">
+      <p15:sldGuideLst xmlns:p15="http://schemas.microsoft.com/office/powerpoint/2012/main"/>
+    </p:ext>
   </p:extLst>
 </p:presentation>
 </file>
@@ -287,7 +290,7 @@
           <a:p>
             <a:fld id="{3969D8E3-D3C3-7642-B20B-7C0235059422}" type="datetimeFigureOut">
               <a:rPr lang="en-GB" smtClean="0"/>
-              <a:t>21/12/2018</a:t>
+              <a:t>04/01/2019</a:t>
             </a:fld>
             <a:endParaRPr lang="en-GB"/>
           </a:p>
@@ -487,7 +490,7 @@
           <a:p>
             <a:fld id="{3969D8E3-D3C3-7642-B20B-7C0235059422}" type="datetimeFigureOut">
               <a:rPr lang="en-GB" smtClean="0"/>
-              <a:t>21/12/2018</a:t>
+              <a:t>04/01/2019</a:t>
             </a:fld>
             <a:endParaRPr lang="en-GB"/>
           </a:p>
@@ -697,7 +700,7 @@
           <a:p>
             <a:fld id="{3969D8E3-D3C3-7642-B20B-7C0235059422}" type="datetimeFigureOut">
               <a:rPr lang="en-GB" smtClean="0"/>
-              <a:t>21/12/2018</a:t>
+              <a:t>04/01/2019</a:t>
             </a:fld>
             <a:endParaRPr lang="en-GB"/>
           </a:p>
@@ -897,7 +900,7 @@
           <a:p>
             <a:fld id="{3969D8E3-D3C3-7642-B20B-7C0235059422}" type="datetimeFigureOut">
               <a:rPr lang="en-GB" smtClean="0"/>
-              <a:t>21/12/2018</a:t>
+              <a:t>04/01/2019</a:t>
             </a:fld>
             <a:endParaRPr lang="en-GB"/>
           </a:p>
@@ -1173,7 +1176,7 @@
           <a:p>
             <a:fld id="{3969D8E3-D3C3-7642-B20B-7C0235059422}" type="datetimeFigureOut">
               <a:rPr lang="en-GB" smtClean="0"/>
-              <a:t>21/12/2018</a:t>
+              <a:t>04/01/2019</a:t>
             </a:fld>
             <a:endParaRPr lang="en-GB"/>
           </a:p>
@@ -1441,7 +1444,7 @@
           <a:p>
             <a:fld id="{3969D8E3-D3C3-7642-B20B-7C0235059422}" type="datetimeFigureOut">
               <a:rPr lang="en-GB" smtClean="0"/>
-              <a:t>21/12/2018</a:t>
+              <a:t>04/01/2019</a:t>
             </a:fld>
             <a:endParaRPr lang="en-GB"/>
           </a:p>
@@ -1856,7 +1859,7 @@
           <a:p>
             <a:fld id="{3969D8E3-D3C3-7642-B20B-7C0235059422}" type="datetimeFigureOut">
               <a:rPr lang="en-GB" smtClean="0"/>
-              <a:t>21/12/2018</a:t>
+              <a:t>04/01/2019</a:t>
             </a:fld>
             <a:endParaRPr lang="en-GB"/>
           </a:p>
@@ -1998,7 +2001,7 @@
           <a:p>
             <a:fld id="{3969D8E3-D3C3-7642-B20B-7C0235059422}" type="datetimeFigureOut">
               <a:rPr lang="en-GB" smtClean="0"/>
-              <a:t>21/12/2018</a:t>
+              <a:t>04/01/2019</a:t>
             </a:fld>
             <a:endParaRPr lang="en-GB"/>
           </a:p>
@@ -2111,7 +2114,7 @@
           <a:p>
             <a:fld id="{3969D8E3-D3C3-7642-B20B-7C0235059422}" type="datetimeFigureOut">
               <a:rPr lang="en-GB" smtClean="0"/>
-              <a:t>21/12/2018</a:t>
+              <a:t>04/01/2019</a:t>
             </a:fld>
             <a:endParaRPr lang="en-GB"/>
           </a:p>
@@ -2424,7 +2427,7 @@
           <a:p>
             <a:fld id="{3969D8E3-D3C3-7642-B20B-7C0235059422}" type="datetimeFigureOut">
               <a:rPr lang="en-GB" smtClean="0"/>
-              <a:t>21/12/2018</a:t>
+              <a:t>04/01/2019</a:t>
             </a:fld>
             <a:endParaRPr lang="en-GB"/>
           </a:p>
@@ -2713,7 +2716,7 @@
           <a:p>
             <a:fld id="{3969D8E3-D3C3-7642-B20B-7C0235059422}" type="datetimeFigureOut">
               <a:rPr lang="en-GB" smtClean="0"/>
-              <a:t>21/12/2018</a:t>
+              <a:t>04/01/2019</a:t>
             </a:fld>
             <a:endParaRPr lang="en-GB"/>
           </a:p>
@@ -2956,7 +2959,7 @@
           <a:p>
             <a:fld id="{3969D8E3-D3C3-7642-B20B-7C0235059422}" type="datetimeFigureOut">
               <a:rPr lang="en-GB" smtClean="0"/>
-              <a:t>21/12/2018</a:t>
+              <a:t>04/01/2019</a:t>
             </a:fld>
             <a:endParaRPr lang="en-GB"/>
           </a:p>
@@ -3421,7 +3424,9 @@
         </p:nvSpPr>
         <p:spPr/>
         <p:txBody>
-          <a:bodyPr/>
+          <a:bodyPr>
+            <a:normAutofit/>
+          </a:bodyPr>
           <a:lstStyle/>
           <a:p>
             <a:r>
@@ -3431,12 +3436,58 @@
           </a:p>
           <a:p>
             <a:r>
+              <a:rPr lang="en-GB" dirty="0" err="1"/>
+              <a:t>Progetto</a:t>
+            </a:r>
+            <a:r>
+              <a:rPr lang="en-GB" dirty="0"/>
+              <a:t> “AMORE”</a:t>
+            </a:r>
+          </a:p>
+          <a:p>
+            <a:r>
               <a:rPr lang="en-GB" dirty="0"/>
               <a:t>20/12/2018</a:t>
             </a:r>
           </a:p>
         </p:txBody>
       </p:sp>
+      <p:pic>
+        <p:nvPicPr>
+          <p:cNvPr id="4" name="Picture 3">
+            <a:extLst>
+              <a:ext uri="{FF2B5EF4-FFF2-40B4-BE49-F238E27FC236}">
+                <a16:creationId xmlns:a16="http://schemas.microsoft.com/office/drawing/2014/main" id="{E60BC5A2-4072-2F41-AE5D-708C8523322C}"/>
+              </a:ext>
+            </a:extLst>
+          </p:cNvPr>
+          <p:cNvPicPr>
+            <a:picLocks noChangeAspect="1"/>
+          </p:cNvPicPr>
+          <p:nvPr/>
+        </p:nvPicPr>
+        <p:blipFill>
+          <a:blip r:embed="rId2" cstate="print">
+            <a:extLst>
+              <a:ext uri="{28A0092B-C50C-407E-A947-70E740481C1C}">
+                <a14:useLocalDpi xmlns:a14="http://schemas.microsoft.com/office/drawing/2010/main" val="0"/>
+              </a:ext>
+            </a:extLst>
+          </a:blip>
+          <a:stretch>
+            <a:fillRect/>
+          </a:stretch>
+        </p:blipFill>
+        <p:spPr>
+          <a:xfrm>
+            <a:off x="4143457" y="5735637"/>
+            <a:ext cx="3905085" cy="698644"/>
+          </a:xfrm>
+          <a:prstGeom prst="rect">
+            <a:avLst/>
+          </a:prstGeom>
+        </p:spPr>
+      </p:pic>
     </p:spTree>
     <p:extLst>
       <p:ext uri="{BB962C8B-B14F-4D97-AF65-F5344CB8AC3E}">
@@ -3475,21 +3526,21 @@
           <a:chExt cx="0" cy="0"/>
         </a:xfrm>
       </p:grpSpPr>
-      <p:cxnSp>
-        <p:nvCxnSpPr>
-          <p:cNvPr id="42" name="Straight Connector 41">
-            <a:extLst>
-              <a:ext uri="{FF2B5EF4-FFF2-40B4-BE49-F238E27FC236}">
-                <a16:creationId xmlns:a16="http://schemas.microsoft.com/office/drawing/2014/main" id="{DB146403-F3D6-484B-B2ED-97F9565D0370}"/>
+      <p:sp>
+        <p:nvSpPr>
+          <p:cNvPr id="51" name="Rectangle 50">
+            <a:extLst>
+              <a:ext uri="{FF2B5EF4-FFF2-40B4-BE49-F238E27FC236}">
+                <a16:creationId xmlns:a16="http://schemas.microsoft.com/office/drawing/2014/main" id="{823AC064-BC96-4F32-8AE1-B2FD38754823}"/>
               </a:ext>
               <a:ext uri="{C183D7F6-B498-43B3-948B-1728B52AA6E4}">
                 <adec:decorative xmlns:adec="http://schemas.microsoft.com/office/drawing/2017/decorative" val="1"/>
               </a:ext>
             </a:extLst>
           </p:cNvPr>
-          <p:cNvCxnSpPr>
-            <a:cxnSpLocks noGrp="1" noRot="1" noChangeAspect="1" noMove="1" noResize="1" noEditPoints="1" noAdjustHandles="1" noChangeArrowheads="1" noChangeShapeType="1"/>
-          </p:cNvCxnSpPr>
+          <p:cNvSpPr>
+            <a:spLocks noGrp="1" noRot="1" noChangeAspect="1" noMove="1" noResize="1" noEditPoints="1" noAdjustHandles="1" noChangeArrowheads="1" noChangeShapeType="1" noTextEdit="1"/>
+          </p:cNvSpPr>
           <p:nvPr>
             <p:extLst>
               <p:ext uri="{386F3935-93C4-4BCD-93E2-E3B085C9AB24}">
@@ -3497,62 +3548,10 @@
               </p:ext>
             </p:extLst>
           </p:nvPr>
-        </p:nvCxnSpPr>
-        <p:spPr>
-          <a:xfrm>
-            <a:off x="6096000" y="477749"/>
-            <a:ext cx="0" cy="3657600"/>
-          </a:xfrm>
-          <a:prstGeom prst="line">
-            <a:avLst/>
-          </a:prstGeom>
-          <a:ln w="101600" cmpd="dbl">
-            <a:solidFill>
-              <a:srgbClr val="595959"/>
-            </a:solidFill>
-          </a:ln>
-        </p:spPr>
-        <p:style>
-          <a:lnRef idx="1">
-            <a:schemeClr val="accent1"/>
-          </a:lnRef>
-          <a:fillRef idx="0">
-            <a:schemeClr val="accent1"/>
-          </a:fillRef>
-          <a:effectRef idx="0">
-            <a:schemeClr val="accent1"/>
-          </a:effectRef>
-          <a:fontRef idx="minor">
-            <a:schemeClr val="tx1"/>
-          </a:fontRef>
-        </p:style>
-      </p:cxnSp>
-      <p:sp>
-        <p:nvSpPr>
-          <p:cNvPr id="44" name="Rectangle 43">
-            <a:extLst>
-              <a:ext uri="{FF2B5EF4-FFF2-40B4-BE49-F238E27FC236}">
-                <a16:creationId xmlns:a16="http://schemas.microsoft.com/office/drawing/2014/main" id="{823AC064-BC96-4F32-8AE1-B2FD38754823}"/>
-              </a:ext>
-              <a:ext uri="{C183D7F6-B498-43B3-948B-1728B52AA6E4}">
-                <adec:decorative xmlns:adec="http://schemas.microsoft.com/office/drawing/2017/decorative" val="1"/>
-              </a:ext>
-            </a:extLst>
-          </p:cNvPr>
-          <p:cNvSpPr>
-            <a:spLocks noGrp="1" noRot="1" noChangeAspect="1" noMove="1" noResize="1" noEditPoints="1" noAdjustHandles="1" noChangeArrowheads="1" noChangeShapeType="1" noTextEdit="1"/>
-          </p:cNvSpPr>
-          <p:nvPr>
-            <p:extLst>
-              <p:ext uri="{386F3935-93C4-4BCD-93E2-E3B085C9AB24}">
-                <p16:designElem xmlns:p16="http://schemas.microsoft.com/office/powerpoint/2015/main" val="1"/>
-              </p:ext>
-            </p:extLst>
-          </p:nvPr>
         </p:nvSpPr>
         <p:spPr bwMode="ltGray">
           <a:xfrm>
-            <a:off x="378068" y="4633546"/>
+            <a:off x="396882" y="280374"/>
             <a:ext cx="11438793" cy="1844256"/>
           </a:xfrm>
           <a:prstGeom prst="rect">
@@ -3610,7 +3609,7 @@
         </p:nvSpPr>
         <p:spPr>
           <a:xfrm>
-            <a:off x="527538" y="4756638"/>
+            <a:off x="546351" y="433545"/>
             <a:ext cx="11139854" cy="930447"/>
           </a:xfrm>
         </p:spPr>
@@ -3632,6 +3631,58 @@
           </a:p>
         </p:txBody>
       </p:sp>
+      <p:cxnSp>
+        <p:nvCxnSpPr>
+          <p:cNvPr id="53" name="Straight Connector 52">
+            <a:extLst>
+              <a:ext uri="{FF2B5EF4-FFF2-40B4-BE49-F238E27FC236}">
+                <a16:creationId xmlns:a16="http://schemas.microsoft.com/office/drawing/2014/main" id="{7E7C77BC-7138-40B1-A15B-20F57A494629}"/>
+              </a:ext>
+              <a:ext uri="{C183D7F6-B498-43B3-948B-1728B52AA6E4}">
+                <adec:decorative xmlns:adec="http://schemas.microsoft.com/office/drawing/2017/decorative" val="1"/>
+              </a:ext>
+            </a:extLst>
+          </p:cNvPr>
+          <p:cNvCxnSpPr>
+            <a:cxnSpLocks noGrp="1" noRot="1" noChangeAspect="1" noMove="1" noResize="1" noEditPoints="1" noAdjustHandles="1" noChangeArrowheads="1" noChangeShapeType="1"/>
+          </p:cNvCxnSpPr>
+          <p:nvPr>
+            <p:extLst>
+              <p:ext uri="{386F3935-93C4-4BCD-93E2-E3B085C9AB24}">
+                <p16:designElem xmlns:p16="http://schemas.microsoft.com/office/powerpoint/2015/main" val="1"/>
+              </p:ext>
+            </p:extLst>
+          </p:nvPr>
+        </p:nvCxnSpPr>
+        <p:spPr>
+          <a:xfrm>
+            <a:off x="2230078" y="1522292"/>
+            <a:ext cx="7772400" cy="0"/>
+          </a:xfrm>
+          <a:prstGeom prst="line">
+            <a:avLst/>
+          </a:prstGeom>
+          <a:ln w="22225">
+            <a:solidFill>
+              <a:srgbClr val="D9D9D9"/>
+            </a:solidFill>
+          </a:ln>
+        </p:spPr>
+        <p:style>
+          <a:lnRef idx="1">
+            <a:schemeClr val="accent1"/>
+          </a:lnRef>
+          <a:fillRef idx="0">
+            <a:schemeClr val="accent1"/>
+          </a:fillRef>
+          <a:effectRef idx="0">
+            <a:schemeClr val="accent1"/>
+          </a:effectRef>
+          <a:fontRef idx="minor">
+            <a:schemeClr val="tx1"/>
+          </a:fontRef>
+        </p:style>
+      </p:cxnSp>
       <p:pic>
         <p:nvPicPr>
           <p:cNvPr id="11" name="Content Placeholder 10">
@@ -3656,7 +3707,7 @@
         </p:blipFill>
         <p:spPr>
           <a:xfrm>
-            <a:off x="382907" y="307731"/>
+            <a:off x="394434" y="2426818"/>
             <a:ext cx="5330183" cy="3997637"/>
           </a:xfrm>
           <a:prstGeom prst="rect">
@@ -3664,6 +3715,58 @@
           </a:prstGeom>
         </p:spPr>
       </p:pic>
+      <p:cxnSp>
+        <p:nvCxnSpPr>
+          <p:cNvPr id="55" name="Straight Connector 54">
+            <a:extLst>
+              <a:ext uri="{FF2B5EF4-FFF2-40B4-BE49-F238E27FC236}">
+                <a16:creationId xmlns:a16="http://schemas.microsoft.com/office/drawing/2014/main" id="{DB146403-F3D6-484B-B2ED-97F9565D0370}"/>
+              </a:ext>
+              <a:ext uri="{C183D7F6-B498-43B3-948B-1728B52AA6E4}">
+                <adec:decorative xmlns:adec="http://schemas.microsoft.com/office/drawing/2017/decorative" val="1"/>
+              </a:ext>
+            </a:extLst>
+          </p:cNvPr>
+          <p:cNvCxnSpPr>
+            <a:cxnSpLocks noGrp="1" noRot="1" noChangeAspect="1" noMove="1" noResize="1" noEditPoints="1" noAdjustHandles="1" noChangeArrowheads="1" noChangeShapeType="1"/>
+          </p:cNvCxnSpPr>
+          <p:nvPr>
+            <p:extLst>
+              <p:ext uri="{386F3935-93C4-4BCD-93E2-E3B085C9AB24}">
+                <p16:designElem xmlns:p16="http://schemas.microsoft.com/office/powerpoint/2015/main" val="1"/>
+              </p:ext>
+            </p:extLst>
+          </p:nvPr>
+        </p:nvCxnSpPr>
+        <p:spPr>
+          <a:xfrm>
+            <a:off x="6116278" y="2596836"/>
+            <a:ext cx="0" cy="3657600"/>
+          </a:xfrm>
+          <a:prstGeom prst="line">
+            <a:avLst/>
+          </a:prstGeom>
+          <a:ln w="101600" cmpd="dbl">
+            <a:solidFill>
+              <a:srgbClr val="595959"/>
+            </a:solidFill>
+          </a:ln>
+        </p:spPr>
+        <p:style>
+          <a:lnRef idx="1">
+            <a:schemeClr val="accent1"/>
+          </a:lnRef>
+          <a:fillRef idx="0">
+            <a:schemeClr val="accent1"/>
+          </a:fillRef>
+          <a:effectRef idx="0">
+            <a:schemeClr val="accent1"/>
+          </a:effectRef>
+          <a:fontRef idx="minor">
+            <a:schemeClr val="tx1"/>
+          </a:fontRef>
+        </p:style>
+      </p:cxnSp>
       <p:pic>
         <p:nvPicPr>
           <p:cNvPr id="15" name="Picture 14">
@@ -3686,7 +3789,7 @@
         </p:blipFill>
         <p:spPr>
           <a:xfrm>
-            <a:off x="6478910" y="307731"/>
+            <a:off x="6507940" y="2426818"/>
             <a:ext cx="5330183" cy="3997637"/>
           </a:xfrm>
           <a:prstGeom prst="rect">
@@ -3694,58 +3797,6 @@
           </a:prstGeom>
         </p:spPr>
       </p:pic>
-      <p:cxnSp>
-        <p:nvCxnSpPr>
-          <p:cNvPr id="46" name="Straight Connector 45">
-            <a:extLst>
-              <a:ext uri="{FF2B5EF4-FFF2-40B4-BE49-F238E27FC236}">
-                <a16:creationId xmlns:a16="http://schemas.microsoft.com/office/drawing/2014/main" id="{7E7C77BC-7138-40B1-A15B-20F57A494629}"/>
-              </a:ext>
-              <a:ext uri="{C183D7F6-B498-43B3-948B-1728B52AA6E4}">
-                <adec:decorative xmlns:adec="http://schemas.microsoft.com/office/drawing/2017/decorative" val="1"/>
-              </a:ext>
-            </a:extLst>
-          </p:cNvPr>
-          <p:cNvCxnSpPr>
-            <a:cxnSpLocks noGrp="1" noRot="1" noChangeAspect="1" noMove="1" noResize="1" noEditPoints="1" noAdjustHandles="1" noChangeArrowheads="1" noChangeShapeType="1"/>
-          </p:cNvCxnSpPr>
-          <p:nvPr>
-            <p:extLst>
-              <p:ext uri="{386F3935-93C4-4BCD-93E2-E3B085C9AB24}">
-                <p16:designElem xmlns:p16="http://schemas.microsoft.com/office/powerpoint/2015/main" val="1"/>
-              </p:ext>
-            </p:extLst>
-          </p:nvPr>
-        </p:nvCxnSpPr>
-        <p:spPr>
-          <a:xfrm>
-            <a:off x="2209800" y="5738691"/>
-            <a:ext cx="7772400" cy="0"/>
-          </a:xfrm>
-          <a:prstGeom prst="line">
-            <a:avLst/>
-          </a:prstGeom>
-          <a:ln w="22225">
-            <a:solidFill>
-              <a:srgbClr val="D9D9D9"/>
-            </a:solidFill>
-          </a:ln>
-        </p:spPr>
-        <p:style>
-          <a:lnRef idx="1">
-            <a:schemeClr val="accent1"/>
-          </a:lnRef>
-          <a:fillRef idx="0">
-            <a:schemeClr val="accent1"/>
-          </a:fillRef>
-          <a:effectRef idx="0">
-            <a:schemeClr val="accent1"/>
-          </a:effectRef>
-          <a:fontRef idx="minor">
-            <a:schemeClr val="tx1"/>
-          </a:fontRef>
-        </p:style>
-      </p:cxnSp>
     </p:spTree>
     <p:extLst>
       <p:ext uri="{BB962C8B-B14F-4D97-AF65-F5344CB8AC3E}">
@@ -3784,21 +3835,21 @@
           <a:chExt cx="0" cy="0"/>
         </a:xfrm>
       </p:grpSpPr>
-      <p:cxnSp>
-        <p:nvCxnSpPr>
-          <p:cNvPr id="12" name="Straight Connector 11">
-            <a:extLst>
-              <a:ext uri="{FF2B5EF4-FFF2-40B4-BE49-F238E27FC236}">
-                <a16:creationId xmlns:a16="http://schemas.microsoft.com/office/drawing/2014/main" id="{DB146403-F3D6-484B-B2ED-97F9565D0370}"/>
+      <p:sp>
+        <p:nvSpPr>
+          <p:cNvPr id="21" name="Rectangle 20">
+            <a:extLst>
+              <a:ext uri="{FF2B5EF4-FFF2-40B4-BE49-F238E27FC236}">
+                <a16:creationId xmlns:a16="http://schemas.microsoft.com/office/drawing/2014/main" id="{823AC064-BC96-4F32-8AE1-B2FD38754823}"/>
               </a:ext>
               <a:ext uri="{C183D7F6-B498-43B3-948B-1728B52AA6E4}">
                 <adec:decorative xmlns:adec="http://schemas.microsoft.com/office/drawing/2017/decorative" val="1"/>
               </a:ext>
             </a:extLst>
           </p:cNvPr>
-          <p:cNvCxnSpPr>
-            <a:cxnSpLocks noGrp="1" noRot="1" noChangeAspect="1" noMove="1" noResize="1" noEditPoints="1" noAdjustHandles="1" noChangeArrowheads="1" noChangeShapeType="1"/>
-          </p:cNvCxnSpPr>
+          <p:cNvSpPr>
+            <a:spLocks noGrp="1" noRot="1" noChangeAspect="1" noMove="1" noResize="1" noEditPoints="1" noAdjustHandles="1" noChangeArrowheads="1" noChangeShapeType="1" noTextEdit="1"/>
+          </p:cNvSpPr>
           <p:nvPr>
             <p:extLst>
               <p:ext uri="{386F3935-93C4-4BCD-93E2-E3B085C9AB24}">
@@ -3806,62 +3857,10 @@
               </p:ext>
             </p:extLst>
           </p:nvPr>
-        </p:nvCxnSpPr>
-        <p:spPr>
-          <a:xfrm>
-            <a:off x="6096000" y="477749"/>
-            <a:ext cx="0" cy="3657600"/>
-          </a:xfrm>
-          <a:prstGeom prst="line">
-            <a:avLst/>
-          </a:prstGeom>
-          <a:ln w="101600" cmpd="dbl">
-            <a:solidFill>
-              <a:srgbClr val="595959"/>
-            </a:solidFill>
-          </a:ln>
-        </p:spPr>
-        <p:style>
-          <a:lnRef idx="1">
-            <a:schemeClr val="accent1"/>
-          </a:lnRef>
-          <a:fillRef idx="0">
-            <a:schemeClr val="accent1"/>
-          </a:fillRef>
-          <a:effectRef idx="0">
-            <a:schemeClr val="accent1"/>
-          </a:effectRef>
-          <a:fontRef idx="minor">
-            <a:schemeClr val="tx1"/>
-          </a:fontRef>
-        </p:style>
-      </p:cxnSp>
-      <p:sp>
-        <p:nvSpPr>
-          <p:cNvPr id="14" name="Rectangle 13">
-            <a:extLst>
-              <a:ext uri="{FF2B5EF4-FFF2-40B4-BE49-F238E27FC236}">
-                <a16:creationId xmlns:a16="http://schemas.microsoft.com/office/drawing/2014/main" id="{823AC064-BC96-4F32-8AE1-B2FD38754823}"/>
-              </a:ext>
-              <a:ext uri="{C183D7F6-B498-43B3-948B-1728B52AA6E4}">
-                <adec:decorative xmlns:adec="http://schemas.microsoft.com/office/drawing/2017/decorative" val="1"/>
-              </a:ext>
-            </a:extLst>
-          </p:cNvPr>
-          <p:cNvSpPr>
-            <a:spLocks noGrp="1" noRot="1" noChangeAspect="1" noMove="1" noResize="1" noEditPoints="1" noAdjustHandles="1" noChangeArrowheads="1" noChangeShapeType="1" noTextEdit="1"/>
-          </p:cNvSpPr>
-          <p:nvPr>
-            <p:extLst>
-              <p:ext uri="{386F3935-93C4-4BCD-93E2-E3B085C9AB24}">
-                <p16:designElem xmlns:p16="http://schemas.microsoft.com/office/powerpoint/2015/main" val="1"/>
-              </p:ext>
-            </p:extLst>
-          </p:nvPr>
         </p:nvSpPr>
         <p:spPr bwMode="ltGray">
           <a:xfrm>
-            <a:off x="378068" y="4633546"/>
+            <a:off x="396882" y="280374"/>
             <a:ext cx="11438793" cy="1844256"/>
           </a:xfrm>
           <a:prstGeom prst="rect">
@@ -3919,7 +3918,7 @@
         </p:nvSpPr>
         <p:spPr>
           <a:xfrm>
-            <a:off x="527538" y="4756638"/>
+            <a:off x="546351" y="433545"/>
             <a:ext cx="11139854" cy="930447"/>
           </a:xfrm>
         </p:spPr>
@@ -3941,6 +3940,58 @@
           </a:p>
         </p:txBody>
       </p:sp>
+      <p:cxnSp>
+        <p:nvCxnSpPr>
+          <p:cNvPr id="23" name="Straight Connector 22">
+            <a:extLst>
+              <a:ext uri="{FF2B5EF4-FFF2-40B4-BE49-F238E27FC236}">
+                <a16:creationId xmlns:a16="http://schemas.microsoft.com/office/drawing/2014/main" id="{7E7C77BC-7138-40B1-A15B-20F57A494629}"/>
+              </a:ext>
+              <a:ext uri="{C183D7F6-B498-43B3-948B-1728B52AA6E4}">
+                <adec:decorative xmlns:adec="http://schemas.microsoft.com/office/drawing/2017/decorative" val="1"/>
+              </a:ext>
+            </a:extLst>
+          </p:cNvPr>
+          <p:cNvCxnSpPr>
+            <a:cxnSpLocks noGrp="1" noRot="1" noChangeAspect="1" noMove="1" noResize="1" noEditPoints="1" noAdjustHandles="1" noChangeArrowheads="1" noChangeShapeType="1"/>
+          </p:cNvCxnSpPr>
+          <p:nvPr>
+            <p:extLst>
+              <p:ext uri="{386F3935-93C4-4BCD-93E2-E3B085C9AB24}">
+                <p16:designElem xmlns:p16="http://schemas.microsoft.com/office/powerpoint/2015/main" val="1"/>
+              </p:ext>
+            </p:extLst>
+          </p:nvPr>
+        </p:nvCxnSpPr>
+        <p:spPr>
+          <a:xfrm>
+            <a:off x="2230078" y="1522292"/>
+            <a:ext cx="7772400" cy="0"/>
+          </a:xfrm>
+          <a:prstGeom prst="line">
+            <a:avLst/>
+          </a:prstGeom>
+          <a:ln w="22225">
+            <a:solidFill>
+              <a:srgbClr val="D9D9D9"/>
+            </a:solidFill>
+          </a:ln>
+        </p:spPr>
+        <p:style>
+          <a:lnRef idx="1">
+            <a:schemeClr val="accent1"/>
+          </a:lnRef>
+          <a:fillRef idx="0">
+            <a:schemeClr val="accent1"/>
+          </a:fillRef>
+          <a:effectRef idx="0">
+            <a:schemeClr val="accent1"/>
+          </a:effectRef>
+          <a:fontRef idx="minor">
+            <a:schemeClr val="tx1"/>
+          </a:fontRef>
+        </p:style>
+      </p:cxnSp>
       <p:pic>
         <p:nvPicPr>
           <p:cNvPr id="7" name="Picture 6">
@@ -3963,7 +4014,7 @@
         </p:blipFill>
         <p:spPr>
           <a:xfrm>
-            <a:off x="382907" y="307731"/>
+            <a:off x="394434" y="2426818"/>
             <a:ext cx="5330183" cy="3997637"/>
           </a:xfrm>
           <a:prstGeom prst="rect">
@@ -3971,6 +4022,58 @@
           </a:prstGeom>
         </p:spPr>
       </p:pic>
+      <p:cxnSp>
+        <p:nvCxnSpPr>
+          <p:cNvPr id="25" name="Straight Connector 24">
+            <a:extLst>
+              <a:ext uri="{FF2B5EF4-FFF2-40B4-BE49-F238E27FC236}">
+                <a16:creationId xmlns:a16="http://schemas.microsoft.com/office/drawing/2014/main" id="{DB146403-F3D6-484B-B2ED-97F9565D0370}"/>
+              </a:ext>
+              <a:ext uri="{C183D7F6-B498-43B3-948B-1728B52AA6E4}">
+                <adec:decorative xmlns:adec="http://schemas.microsoft.com/office/drawing/2017/decorative" val="1"/>
+              </a:ext>
+            </a:extLst>
+          </p:cNvPr>
+          <p:cNvCxnSpPr>
+            <a:cxnSpLocks noGrp="1" noRot="1" noChangeAspect="1" noMove="1" noResize="1" noEditPoints="1" noAdjustHandles="1" noChangeArrowheads="1" noChangeShapeType="1"/>
+          </p:cNvCxnSpPr>
+          <p:nvPr>
+            <p:extLst>
+              <p:ext uri="{386F3935-93C4-4BCD-93E2-E3B085C9AB24}">
+                <p16:designElem xmlns:p16="http://schemas.microsoft.com/office/powerpoint/2015/main" val="1"/>
+              </p:ext>
+            </p:extLst>
+          </p:nvPr>
+        </p:nvCxnSpPr>
+        <p:spPr>
+          <a:xfrm>
+            <a:off x="6116278" y="2596836"/>
+            <a:ext cx="0" cy="3657600"/>
+          </a:xfrm>
+          <a:prstGeom prst="line">
+            <a:avLst/>
+          </a:prstGeom>
+          <a:ln w="101600" cmpd="dbl">
+            <a:solidFill>
+              <a:srgbClr val="595959"/>
+            </a:solidFill>
+          </a:ln>
+        </p:spPr>
+        <p:style>
+          <a:lnRef idx="1">
+            <a:schemeClr val="accent1"/>
+          </a:lnRef>
+          <a:fillRef idx="0">
+            <a:schemeClr val="accent1"/>
+          </a:fillRef>
+          <a:effectRef idx="0">
+            <a:schemeClr val="accent1"/>
+          </a:effectRef>
+          <a:fontRef idx="minor">
+            <a:schemeClr val="tx1"/>
+          </a:fontRef>
+        </p:style>
+      </p:cxnSp>
       <p:pic>
         <p:nvPicPr>
           <p:cNvPr id="5" name="Content Placeholder 4">
@@ -3995,66 +4098,14 @@
         </p:blipFill>
         <p:spPr>
           <a:xfrm>
-            <a:off x="6314448" y="306513"/>
-            <a:ext cx="5877552" cy="3849797"/>
+            <a:off x="6445073" y="2638823"/>
+            <a:ext cx="5455917" cy="3573626"/>
           </a:xfrm>
           <a:prstGeom prst="rect">
             <a:avLst/>
           </a:prstGeom>
         </p:spPr>
       </p:pic>
-      <p:cxnSp>
-        <p:nvCxnSpPr>
-          <p:cNvPr id="16" name="Straight Connector 15">
-            <a:extLst>
-              <a:ext uri="{FF2B5EF4-FFF2-40B4-BE49-F238E27FC236}">
-                <a16:creationId xmlns:a16="http://schemas.microsoft.com/office/drawing/2014/main" id="{7E7C77BC-7138-40B1-A15B-20F57A494629}"/>
-              </a:ext>
-              <a:ext uri="{C183D7F6-B498-43B3-948B-1728B52AA6E4}">
-                <adec:decorative xmlns:adec="http://schemas.microsoft.com/office/drawing/2017/decorative" val="1"/>
-              </a:ext>
-            </a:extLst>
-          </p:cNvPr>
-          <p:cNvCxnSpPr>
-            <a:cxnSpLocks noGrp="1" noRot="1" noChangeAspect="1" noMove="1" noResize="1" noEditPoints="1" noAdjustHandles="1" noChangeArrowheads="1" noChangeShapeType="1"/>
-          </p:cNvCxnSpPr>
-          <p:nvPr>
-            <p:extLst>
-              <p:ext uri="{386F3935-93C4-4BCD-93E2-E3B085C9AB24}">
-                <p16:designElem xmlns:p16="http://schemas.microsoft.com/office/powerpoint/2015/main" val="1"/>
-              </p:ext>
-            </p:extLst>
-          </p:nvPr>
-        </p:nvCxnSpPr>
-        <p:spPr>
-          <a:xfrm>
-            <a:off x="2209800" y="5738691"/>
-            <a:ext cx="7772400" cy="0"/>
-          </a:xfrm>
-          <a:prstGeom prst="line">
-            <a:avLst/>
-          </a:prstGeom>
-          <a:ln w="22225">
-            <a:solidFill>
-              <a:srgbClr val="D9D9D9"/>
-            </a:solidFill>
-          </a:ln>
-        </p:spPr>
-        <p:style>
-          <a:lnRef idx="1">
-            <a:schemeClr val="accent1"/>
-          </a:lnRef>
-          <a:fillRef idx="0">
-            <a:schemeClr val="accent1"/>
-          </a:fillRef>
-          <a:effectRef idx="0">
-            <a:schemeClr val="accent1"/>
-          </a:effectRef>
-          <a:fontRef idx="minor">
-            <a:schemeClr val="tx1"/>
-          </a:fontRef>
-        </p:style>
-      </p:cxnSp>
     </p:spTree>
     <p:extLst>
       <p:ext uri="{BB962C8B-B14F-4D97-AF65-F5344CB8AC3E}">
@@ -4137,7 +4188,7 @@
         </p:spPr>
         <p:txBody>
           <a:bodyPr>
-            <a:normAutofit fontScale="92500" lnSpcReduction="10000"/>
+            <a:normAutofit fontScale="92500" lnSpcReduction="20000"/>
           </a:bodyPr>
           <a:lstStyle/>
           <a:p>
@@ -4209,6 +4260,20 @@
           <a:p>
             <a:r>
               <a:rPr lang="en-GB" dirty="0"/>
+              <a:t>The numbers represent the different users (</a:t>
+            </a:r>
+            <a:r>
+              <a:rPr lang="en-GB" dirty="0" err="1"/>
+              <a:t>dev_eui</a:t>
+            </a:r>
+            <a:r>
+              <a:rPr lang="en-GB" dirty="0"/>
+              <a:t>) using the network</a:t>
+            </a:r>
+          </a:p>
+          <a:p>
+            <a:r>
+              <a:rPr lang="en-GB" dirty="0"/>
               <a:t>On the x-axis are reported the six different SF values; while on the y-axis are represented the number of users sending using that specific SF, in a precise time interval using a specific GW.</a:t>
             </a:r>
           </a:p>
@@ -4218,10 +4283,13 @@
               <a:t>The time intervals have been selected among the one most busy (</a:t>
             </a:r>
             <a:r>
-              <a:rPr lang="en-GB"/>
-              <a:t>different from GW to GW) </a:t>
-            </a:r>
-            <a:endParaRPr lang="en-GB" dirty="0"/>
+              <a:rPr lang="en-GB" u="sng" dirty="0"/>
+              <a:t>different from GW to GW</a:t>
+            </a:r>
+            <a:r>
+              <a:rPr lang="en-GB" dirty="0"/>
+              <a:t>) </a:t>
+            </a:r>
           </a:p>
         </p:txBody>
       </p:sp>
@@ -4883,7 +4951,7 @@
       </p:grpSpPr>
       <p:sp>
         <p:nvSpPr>
-          <p:cNvPr id="12" name="Rectangle 11">
+          <p:cNvPr id="21" name="Rectangle 20">
             <a:extLst>
               <a:ext uri="{FF2B5EF4-FFF2-40B4-BE49-F238E27FC236}">
                 <a16:creationId xmlns:a16="http://schemas.microsoft.com/office/drawing/2014/main" id="{823AC064-BC96-4F32-8AE1-B2FD38754823}"/>
@@ -4988,7 +5056,7 @@
       </p:sp>
       <p:cxnSp>
         <p:nvCxnSpPr>
-          <p:cNvPr id="14" name="Straight Connector 13">
+          <p:cNvPr id="23" name="Straight Connector 22">
             <a:extLst>
               <a:ext uri="{FF2B5EF4-FFF2-40B4-BE49-F238E27FC236}">
                 <a16:creationId xmlns:a16="http://schemas.microsoft.com/office/drawing/2014/main" id="{7E7C77BC-7138-40B1-A15B-20F57A494629}"/>
@@ -5040,10 +5108,10 @@
       </p:cxnSp>
       <p:pic>
         <p:nvPicPr>
-          <p:cNvPr id="7" name="Picture 6">
-            <a:extLst>
-              <a:ext uri="{FF2B5EF4-FFF2-40B4-BE49-F238E27FC236}">
-                <a16:creationId xmlns:a16="http://schemas.microsoft.com/office/drawing/2014/main" id="{8A0685C1-D019-8149-B7CE-1638F10541FB}"/>
+          <p:cNvPr id="8" name="Picture 7">
+            <a:extLst>
+              <a:ext uri="{FF2B5EF4-FFF2-40B4-BE49-F238E27FC236}">
+                <a16:creationId xmlns:a16="http://schemas.microsoft.com/office/drawing/2014/main" id="{B514E0DE-C246-9948-8518-4A27BD4C6A28}"/>
               </a:ext>
             </a:extLst>
           </p:cNvPr>
@@ -5060,8 +5128,8 @@
         </p:blipFill>
         <p:spPr>
           <a:xfrm>
-            <a:off x="0" y="2426818"/>
-            <a:ext cx="5742503" cy="4278164"/>
+            <a:off x="376547" y="2426818"/>
+            <a:ext cx="5365956" cy="3997637"/>
           </a:xfrm>
           <a:prstGeom prst="rect">
             <a:avLst/>
@@ -5070,7 +5138,7 @@
       </p:pic>
       <p:cxnSp>
         <p:nvCxnSpPr>
-          <p:cNvPr id="16" name="Straight Connector 15">
+          <p:cNvPr id="25" name="Straight Connector 24">
             <a:extLst>
               <a:ext uri="{FF2B5EF4-FFF2-40B4-BE49-F238E27FC236}">
                 <a16:creationId xmlns:a16="http://schemas.microsoft.com/office/drawing/2014/main" id="{DB146403-F3D6-484B-B2ED-97F9565D0370}"/>
@@ -5144,8 +5212,8 @@
         </p:blipFill>
         <p:spPr>
           <a:xfrm>
-            <a:off x="6298283" y="2461506"/>
-            <a:ext cx="5893717" cy="4243476"/>
+            <a:off x="6445073" y="2461506"/>
+            <a:ext cx="5455917" cy="3928260"/>
           </a:xfrm>
           <a:prstGeom prst="rect">
             <a:avLst/>
@@ -5190,21 +5258,21 @@
           <a:chExt cx="0" cy="0"/>
         </a:xfrm>
       </p:grpSpPr>
-      <p:cxnSp>
-        <p:nvCxnSpPr>
-          <p:cNvPr id="18" name="Straight Connector 11">
-            <a:extLst>
-              <a:ext uri="{FF2B5EF4-FFF2-40B4-BE49-F238E27FC236}">
-                <a16:creationId xmlns:a16="http://schemas.microsoft.com/office/drawing/2014/main" id="{DB146403-F3D6-484B-B2ED-97F9565D0370}"/>
+      <p:sp>
+        <p:nvSpPr>
+          <p:cNvPr id="25" name="Rectangle 24">
+            <a:extLst>
+              <a:ext uri="{FF2B5EF4-FFF2-40B4-BE49-F238E27FC236}">
+                <a16:creationId xmlns:a16="http://schemas.microsoft.com/office/drawing/2014/main" id="{823AC064-BC96-4F32-8AE1-B2FD38754823}"/>
               </a:ext>
               <a:ext uri="{C183D7F6-B498-43B3-948B-1728B52AA6E4}">
                 <adec:decorative xmlns:adec="http://schemas.microsoft.com/office/drawing/2017/decorative" val="1"/>
               </a:ext>
             </a:extLst>
           </p:cNvPr>
-          <p:cNvCxnSpPr>
-            <a:cxnSpLocks noGrp="1" noRot="1" noChangeAspect="1" noMove="1" noResize="1" noEditPoints="1" noAdjustHandles="1" noChangeArrowheads="1" noChangeShapeType="1"/>
-          </p:cNvCxnSpPr>
+          <p:cNvSpPr>
+            <a:spLocks noGrp="1" noRot="1" noChangeAspect="1" noMove="1" noResize="1" noEditPoints="1" noAdjustHandles="1" noChangeArrowheads="1" noChangeShapeType="1" noTextEdit="1"/>
+          </p:cNvSpPr>
           <p:nvPr>
             <p:extLst>
               <p:ext uri="{386F3935-93C4-4BCD-93E2-E3B085C9AB24}">
@@ -5212,62 +5280,10 @@
               </p:ext>
             </p:extLst>
           </p:nvPr>
-        </p:nvCxnSpPr>
-        <p:spPr>
-          <a:xfrm>
-            <a:off x="6096000" y="477749"/>
-            <a:ext cx="0" cy="3657600"/>
-          </a:xfrm>
-          <a:prstGeom prst="line">
-            <a:avLst/>
-          </a:prstGeom>
-          <a:ln w="101600" cmpd="dbl">
-            <a:solidFill>
-              <a:srgbClr val="595959"/>
-            </a:solidFill>
-          </a:ln>
-        </p:spPr>
-        <p:style>
-          <a:lnRef idx="1">
-            <a:schemeClr val="accent1"/>
-          </a:lnRef>
-          <a:fillRef idx="0">
-            <a:schemeClr val="accent1"/>
-          </a:fillRef>
-          <a:effectRef idx="0">
-            <a:schemeClr val="accent1"/>
-          </a:effectRef>
-          <a:fontRef idx="minor">
-            <a:schemeClr val="tx1"/>
-          </a:fontRef>
-        </p:style>
-      </p:cxnSp>
-      <p:sp>
-        <p:nvSpPr>
-          <p:cNvPr id="19" name="Rectangle 13">
-            <a:extLst>
-              <a:ext uri="{FF2B5EF4-FFF2-40B4-BE49-F238E27FC236}">
-                <a16:creationId xmlns:a16="http://schemas.microsoft.com/office/drawing/2014/main" id="{823AC064-BC96-4F32-8AE1-B2FD38754823}"/>
-              </a:ext>
-              <a:ext uri="{C183D7F6-B498-43B3-948B-1728B52AA6E4}">
-                <adec:decorative xmlns:adec="http://schemas.microsoft.com/office/drawing/2017/decorative" val="1"/>
-              </a:ext>
-            </a:extLst>
-          </p:cNvPr>
-          <p:cNvSpPr>
-            <a:spLocks noGrp="1" noRot="1" noChangeAspect="1" noMove="1" noResize="1" noEditPoints="1" noAdjustHandles="1" noChangeArrowheads="1" noChangeShapeType="1" noTextEdit="1"/>
-          </p:cNvSpPr>
-          <p:nvPr>
-            <p:extLst>
-              <p:ext uri="{386F3935-93C4-4BCD-93E2-E3B085C9AB24}">
-                <p16:designElem xmlns:p16="http://schemas.microsoft.com/office/powerpoint/2015/main" val="1"/>
-              </p:ext>
-            </p:extLst>
-          </p:nvPr>
         </p:nvSpPr>
         <p:spPr bwMode="ltGray">
           <a:xfrm>
-            <a:off x="378068" y="4633546"/>
+            <a:off x="396882" y="280374"/>
             <a:ext cx="11438793" cy="1844256"/>
           </a:xfrm>
           <a:prstGeom prst="rect">
@@ -5325,7 +5341,7 @@
         </p:nvSpPr>
         <p:spPr>
           <a:xfrm>
-            <a:off x="527538" y="4756638"/>
+            <a:off x="546351" y="433545"/>
             <a:ext cx="11139854" cy="930447"/>
           </a:xfrm>
         </p:spPr>
@@ -5347,6 +5363,58 @@
           </a:p>
         </p:txBody>
       </p:sp>
+      <p:cxnSp>
+        <p:nvCxnSpPr>
+          <p:cNvPr id="27" name="Straight Connector 26">
+            <a:extLst>
+              <a:ext uri="{FF2B5EF4-FFF2-40B4-BE49-F238E27FC236}">
+                <a16:creationId xmlns:a16="http://schemas.microsoft.com/office/drawing/2014/main" id="{7E7C77BC-7138-40B1-A15B-20F57A494629}"/>
+              </a:ext>
+              <a:ext uri="{C183D7F6-B498-43B3-948B-1728B52AA6E4}">
+                <adec:decorative xmlns:adec="http://schemas.microsoft.com/office/drawing/2017/decorative" val="1"/>
+              </a:ext>
+            </a:extLst>
+          </p:cNvPr>
+          <p:cNvCxnSpPr>
+            <a:cxnSpLocks noGrp="1" noRot="1" noChangeAspect="1" noMove="1" noResize="1" noEditPoints="1" noAdjustHandles="1" noChangeArrowheads="1" noChangeShapeType="1"/>
+          </p:cNvCxnSpPr>
+          <p:nvPr>
+            <p:extLst>
+              <p:ext uri="{386F3935-93C4-4BCD-93E2-E3B085C9AB24}">
+                <p16:designElem xmlns:p16="http://schemas.microsoft.com/office/powerpoint/2015/main" val="1"/>
+              </p:ext>
+            </p:extLst>
+          </p:nvPr>
+        </p:nvCxnSpPr>
+        <p:spPr>
+          <a:xfrm>
+            <a:off x="2230078" y="1522292"/>
+            <a:ext cx="7772400" cy="0"/>
+          </a:xfrm>
+          <a:prstGeom prst="line">
+            <a:avLst/>
+          </a:prstGeom>
+          <a:ln w="22225">
+            <a:solidFill>
+              <a:srgbClr val="D9D9D9"/>
+            </a:solidFill>
+          </a:ln>
+        </p:spPr>
+        <p:style>
+          <a:lnRef idx="1">
+            <a:schemeClr val="accent1"/>
+          </a:lnRef>
+          <a:fillRef idx="0">
+            <a:schemeClr val="accent1"/>
+          </a:fillRef>
+          <a:effectRef idx="0">
+            <a:schemeClr val="accent1"/>
+          </a:effectRef>
+          <a:fontRef idx="minor">
+            <a:schemeClr val="tx1"/>
+          </a:fontRef>
+        </p:style>
+      </p:cxnSp>
       <p:pic>
         <p:nvPicPr>
           <p:cNvPr id="5" name="Content Placeholder 4">
@@ -5371,14 +5439,66 @@
         </p:blipFill>
         <p:spPr>
           <a:xfrm>
-            <a:off x="257175" y="307731"/>
-            <a:ext cx="5455916" cy="4091937"/>
+            <a:off x="394434" y="2426818"/>
+            <a:ext cx="5330183" cy="3997637"/>
           </a:xfrm>
           <a:prstGeom prst="rect">
             <a:avLst/>
           </a:prstGeom>
         </p:spPr>
       </p:pic>
+      <p:cxnSp>
+        <p:nvCxnSpPr>
+          <p:cNvPr id="29" name="Straight Connector 28">
+            <a:extLst>
+              <a:ext uri="{FF2B5EF4-FFF2-40B4-BE49-F238E27FC236}">
+                <a16:creationId xmlns:a16="http://schemas.microsoft.com/office/drawing/2014/main" id="{DB146403-F3D6-484B-B2ED-97F9565D0370}"/>
+              </a:ext>
+              <a:ext uri="{C183D7F6-B498-43B3-948B-1728B52AA6E4}">
+                <adec:decorative xmlns:adec="http://schemas.microsoft.com/office/drawing/2017/decorative" val="1"/>
+              </a:ext>
+            </a:extLst>
+          </p:cNvPr>
+          <p:cNvCxnSpPr>
+            <a:cxnSpLocks noGrp="1" noRot="1" noChangeAspect="1" noMove="1" noResize="1" noEditPoints="1" noAdjustHandles="1" noChangeArrowheads="1" noChangeShapeType="1"/>
+          </p:cNvCxnSpPr>
+          <p:nvPr>
+            <p:extLst>
+              <p:ext uri="{386F3935-93C4-4BCD-93E2-E3B085C9AB24}">
+                <p16:designElem xmlns:p16="http://schemas.microsoft.com/office/powerpoint/2015/main" val="1"/>
+              </p:ext>
+            </p:extLst>
+          </p:nvPr>
+        </p:nvCxnSpPr>
+        <p:spPr>
+          <a:xfrm>
+            <a:off x="6116278" y="2596836"/>
+            <a:ext cx="0" cy="3657600"/>
+          </a:xfrm>
+          <a:prstGeom prst="line">
+            <a:avLst/>
+          </a:prstGeom>
+          <a:ln w="101600" cmpd="dbl">
+            <a:solidFill>
+              <a:srgbClr val="595959"/>
+            </a:solidFill>
+          </a:ln>
+        </p:spPr>
+        <p:style>
+          <a:lnRef idx="1">
+            <a:schemeClr val="accent1"/>
+          </a:lnRef>
+          <a:fillRef idx="0">
+            <a:schemeClr val="accent1"/>
+          </a:fillRef>
+          <a:effectRef idx="0">
+            <a:schemeClr val="accent1"/>
+          </a:effectRef>
+          <a:fontRef idx="minor">
+            <a:schemeClr val="tx1"/>
+          </a:fontRef>
+        </p:style>
+      </p:cxnSp>
       <p:pic>
         <p:nvPicPr>
           <p:cNvPr id="7" name="Picture 6">
@@ -5401,66 +5521,14 @@
         </p:blipFill>
         <p:spPr>
           <a:xfrm>
-            <a:off x="6096001" y="431078"/>
-            <a:ext cx="5775960" cy="3970973"/>
+            <a:off x="6445073" y="2550165"/>
+            <a:ext cx="5455917" cy="3750943"/>
           </a:xfrm>
           <a:prstGeom prst="rect">
             <a:avLst/>
           </a:prstGeom>
         </p:spPr>
       </p:pic>
-      <p:cxnSp>
-        <p:nvCxnSpPr>
-          <p:cNvPr id="20" name="Straight Connector 15">
-            <a:extLst>
-              <a:ext uri="{FF2B5EF4-FFF2-40B4-BE49-F238E27FC236}">
-                <a16:creationId xmlns:a16="http://schemas.microsoft.com/office/drawing/2014/main" id="{7E7C77BC-7138-40B1-A15B-20F57A494629}"/>
-              </a:ext>
-              <a:ext uri="{C183D7F6-B498-43B3-948B-1728B52AA6E4}">
-                <adec:decorative xmlns:adec="http://schemas.microsoft.com/office/drawing/2017/decorative" val="1"/>
-              </a:ext>
-            </a:extLst>
-          </p:cNvPr>
-          <p:cNvCxnSpPr>
-            <a:cxnSpLocks noGrp="1" noRot="1" noChangeAspect="1" noMove="1" noResize="1" noEditPoints="1" noAdjustHandles="1" noChangeArrowheads="1" noChangeShapeType="1"/>
-          </p:cNvCxnSpPr>
-          <p:nvPr>
-            <p:extLst>
-              <p:ext uri="{386F3935-93C4-4BCD-93E2-E3B085C9AB24}">
-                <p16:designElem xmlns:p16="http://schemas.microsoft.com/office/powerpoint/2015/main" val="1"/>
-              </p:ext>
-            </p:extLst>
-          </p:nvPr>
-        </p:nvCxnSpPr>
-        <p:spPr>
-          <a:xfrm>
-            <a:off x="2209800" y="5738691"/>
-            <a:ext cx="7772400" cy="0"/>
-          </a:xfrm>
-          <a:prstGeom prst="line">
-            <a:avLst/>
-          </a:prstGeom>
-          <a:ln w="22225">
-            <a:solidFill>
-              <a:srgbClr val="D9D9D9"/>
-            </a:solidFill>
-          </a:ln>
-        </p:spPr>
-        <p:style>
-          <a:lnRef idx="1">
-            <a:schemeClr val="accent1"/>
-          </a:lnRef>
-          <a:fillRef idx="0">
-            <a:schemeClr val="accent1"/>
-          </a:fillRef>
-          <a:effectRef idx="0">
-            <a:schemeClr val="accent1"/>
-          </a:effectRef>
-          <a:fontRef idx="minor">
-            <a:schemeClr val="tx1"/>
-          </a:fontRef>
-        </p:style>
-      </p:cxnSp>
     </p:spTree>
     <p:extLst>
       <p:ext uri="{BB962C8B-B14F-4D97-AF65-F5344CB8AC3E}">
@@ -5499,21 +5567,21 @@
           <a:chExt cx="0" cy="0"/>
         </a:xfrm>
       </p:grpSpPr>
-      <p:cxnSp>
-        <p:nvCxnSpPr>
-          <p:cNvPr id="12" name="Straight Connector 11">
-            <a:extLst>
-              <a:ext uri="{FF2B5EF4-FFF2-40B4-BE49-F238E27FC236}">
-                <a16:creationId xmlns:a16="http://schemas.microsoft.com/office/drawing/2014/main" id="{DB146403-F3D6-484B-B2ED-97F9565D0370}"/>
+      <p:sp>
+        <p:nvSpPr>
+          <p:cNvPr id="21" name="Rectangle 20">
+            <a:extLst>
+              <a:ext uri="{FF2B5EF4-FFF2-40B4-BE49-F238E27FC236}">
+                <a16:creationId xmlns:a16="http://schemas.microsoft.com/office/drawing/2014/main" id="{823AC064-BC96-4F32-8AE1-B2FD38754823}"/>
               </a:ext>
               <a:ext uri="{C183D7F6-B498-43B3-948B-1728B52AA6E4}">
                 <adec:decorative xmlns:adec="http://schemas.microsoft.com/office/drawing/2017/decorative" val="1"/>
               </a:ext>
             </a:extLst>
           </p:cNvPr>
-          <p:cNvCxnSpPr>
-            <a:cxnSpLocks noGrp="1" noRot="1" noChangeAspect="1" noMove="1" noResize="1" noEditPoints="1" noAdjustHandles="1" noChangeArrowheads="1" noChangeShapeType="1"/>
-          </p:cNvCxnSpPr>
+          <p:cNvSpPr>
+            <a:spLocks noGrp="1" noRot="1" noChangeAspect="1" noMove="1" noResize="1" noEditPoints="1" noAdjustHandles="1" noChangeArrowheads="1" noChangeShapeType="1" noTextEdit="1"/>
+          </p:cNvSpPr>
           <p:nvPr>
             <p:extLst>
               <p:ext uri="{386F3935-93C4-4BCD-93E2-E3B085C9AB24}">
@@ -5521,62 +5589,10 @@
               </p:ext>
             </p:extLst>
           </p:nvPr>
-        </p:nvCxnSpPr>
-        <p:spPr>
-          <a:xfrm>
-            <a:off x="6096000" y="477749"/>
-            <a:ext cx="0" cy="3657600"/>
-          </a:xfrm>
-          <a:prstGeom prst="line">
-            <a:avLst/>
-          </a:prstGeom>
-          <a:ln w="101600" cmpd="dbl">
-            <a:solidFill>
-              <a:srgbClr val="595959"/>
-            </a:solidFill>
-          </a:ln>
-        </p:spPr>
-        <p:style>
-          <a:lnRef idx="1">
-            <a:schemeClr val="accent1"/>
-          </a:lnRef>
-          <a:fillRef idx="0">
-            <a:schemeClr val="accent1"/>
-          </a:fillRef>
-          <a:effectRef idx="0">
-            <a:schemeClr val="accent1"/>
-          </a:effectRef>
-          <a:fontRef idx="minor">
-            <a:schemeClr val="tx1"/>
-          </a:fontRef>
-        </p:style>
-      </p:cxnSp>
-      <p:sp>
-        <p:nvSpPr>
-          <p:cNvPr id="14" name="Rectangle 13">
-            <a:extLst>
-              <a:ext uri="{FF2B5EF4-FFF2-40B4-BE49-F238E27FC236}">
-                <a16:creationId xmlns:a16="http://schemas.microsoft.com/office/drawing/2014/main" id="{823AC064-BC96-4F32-8AE1-B2FD38754823}"/>
-              </a:ext>
-              <a:ext uri="{C183D7F6-B498-43B3-948B-1728B52AA6E4}">
-                <adec:decorative xmlns:adec="http://schemas.microsoft.com/office/drawing/2017/decorative" val="1"/>
-              </a:ext>
-            </a:extLst>
-          </p:cNvPr>
-          <p:cNvSpPr>
-            <a:spLocks noGrp="1" noRot="1" noChangeAspect="1" noMove="1" noResize="1" noEditPoints="1" noAdjustHandles="1" noChangeArrowheads="1" noChangeShapeType="1" noTextEdit="1"/>
-          </p:cNvSpPr>
-          <p:nvPr>
-            <p:extLst>
-              <p:ext uri="{386F3935-93C4-4BCD-93E2-E3B085C9AB24}">
-                <p16:designElem xmlns:p16="http://schemas.microsoft.com/office/powerpoint/2015/main" val="1"/>
-              </p:ext>
-            </p:extLst>
-          </p:nvPr>
         </p:nvSpPr>
         <p:spPr bwMode="ltGray">
           <a:xfrm>
-            <a:off x="378068" y="4633546"/>
+            <a:off x="396882" y="280374"/>
             <a:ext cx="11438793" cy="1844256"/>
           </a:xfrm>
           <a:prstGeom prst="rect">
@@ -5634,7 +5650,7 @@
         </p:nvSpPr>
         <p:spPr>
           <a:xfrm>
-            <a:off x="527538" y="4756638"/>
+            <a:off x="546351" y="433545"/>
             <a:ext cx="11139854" cy="930447"/>
           </a:xfrm>
         </p:spPr>
@@ -5656,6 +5672,58 @@
           </a:p>
         </p:txBody>
       </p:sp>
+      <p:cxnSp>
+        <p:nvCxnSpPr>
+          <p:cNvPr id="23" name="Straight Connector 22">
+            <a:extLst>
+              <a:ext uri="{FF2B5EF4-FFF2-40B4-BE49-F238E27FC236}">
+                <a16:creationId xmlns:a16="http://schemas.microsoft.com/office/drawing/2014/main" id="{7E7C77BC-7138-40B1-A15B-20F57A494629}"/>
+              </a:ext>
+              <a:ext uri="{C183D7F6-B498-43B3-948B-1728B52AA6E4}">
+                <adec:decorative xmlns:adec="http://schemas.microsoft.com/office/drawing/2017/decorative" val="1"/>
+              </a:ext>
+            </a:extLst>
+          </p:cNvPr>
+          <p:cNvCxnSpPr>
+            <a:cxnSpLocks noGrp="1" noRot="1" noChangeAspect="1" noMove="1" noResize="1" noEditPoints="1" noAdjustHandles="1" noChangeArrowheads="1" noChangeShapeType="1"/>
+          </p:cNvCxnSpPr>
+          <p:nvPr>
+            <p:extLst>
+              <p:ext uri="{386F3935-93C4-4BCD-93E2-E3B085C9AB24}">
+                <p16:designElem xmlns:p16="http://schemas.microsoft.com/office/powerpoint/2015/main" val="1"/>
+              </p:ext>
+            </p:extLst>
+          </p:nvPr>
+        </p:nvCxnSpPr>
+        <p:spPr>
+          <a:xfrm>
+            <a:off x="2230078" y="1522292"/>
+            <a:ext cx="7772400" cy="0"/>
+          </a:xfrm>
+          <a:prstGeom prst="line">
+            <a:avLst/>
+          </a:prstGeom>
+          <a:ln w="22225">
+            <a:solidFill>
+              <a:srgbClr val="D9D9D9"/>
+            </a:solidFill>
+          </a:ln>
+        </p:spPr>
+        <p:style>
+          <a:lnRef idx="1">
+            <a:schemeClr val="accent1"/>
+          </a:lnRef>
+          <a:fillRef idx="0">
+            <a:schemeClr val="accent1"/>
+          </a:fillRef>
+          <a:effectRef idx="0">
+            <a:schemeClr val="accent1"/>
+          </a:effectRef>
+          <a:fontRef idx="minor">
+            <a:schemeClr val="tx1"/>
+          </a:fontRef>
+        </p:style>
+      </p:cxnSp>
       <p:pic>
         <p:nvPicPr>
           <p:cNvPr id="5" name="Content Placeholder 4">
@@ -5680,14 +5748,66 @@
         </p:blipFill>
         <p:spPr>
           <a:xfrm>
-            <a:off x="190509" y="307731"/>
-            <a:ext cx="5522582" cy="4141936"/>
+            <a:off x="394434" y="2426818"/>
+            <a:ext cx="5330183" cy="3997637"/>
           </a:xfrm>
           <a:prstGeom prst="rect">
             <a:avLst/>
           </a:prstGeom>
         </p:spPr>
       </p:pic>
+      <p:cxnSp>
+        <p:nvCxnSpPr>
+          <p:cNvPr id="25" name="Straight Connector 24">
+            <a:extLst>
+              <a:ext uri="{FF2B5EF4-FFF2-40B4-BE49-F238E27FC236}">
+                <a16:creationId xmlns:a16="http://schemas.microsoft.com/office/drawing/2014/main" id="{DB146403-F3D6-484B-B2ED-97F9565D0370}"/>
+              </a:ext>
+              <a:ext uri="{C183D7F6-B498-43B3-948B-1728B52AA6E4}">
+                <adec:decorative xmlns:adec="http://schemas.microsoft.com/office/drawing/2017/decorative" val="1"/>
+              </a:ext>
+            </a:extLst>
+          </p:cNvPr>
+          <p:cNvCxnSpPr>
+            <a:cxnSpLocks noGrp="1" noRot="1" noChangeAspect="1" noMove="1" noResize="1" noEditPoints="1" noAdjustHandles="1" noChangeArrowheads="1" noChangeShapeType="1"/>
+          </p:cNvCxnSpPr>
+          <p:nvPr>
+            <p:extLst>
+              <p:ext uri="{386F3935-93C4-4BCD-93E2-E3B085C9AB24}">
+                <p16:designElem xmlns:p16="http://schemas.microsoft.com/office/powerpoint/2015/main" val="1"/>
+              </p:ext>
+            </p:extLst>
+          </p:nvPr>
+        </p:nvCxnSpPr>
+        <p:spPr>
+          <a:xfrm>
+            <a:off x="6116278" y="2596836"/>
+            <a:ext cx="0" cy="3657600"/>
+          </a:xfrm>
+          <a:prstGeom prst="line">
+            <a:avLst/>
+          </a:prstGeom>
+          <a:ln w="101600" cmpd="dbl">
+            <a:solidFill>
+              <a:srgbClr val="595959"/>
+            </a:solidFill>
+          </a:ln>
+        </p:spPr>
+        <p:style>
+          <a:lnRef idx="1">
+            <a:schemeClr val="accent1"/>
+          </a:lnRef>
+          <a:fillRef idx="0">
+            <a:schemeClr val="accent1"/>
+          </a:fillRef>
+          <a:effectRef idx="0">
+            <a:schemeClr val="accent1"/>
+          </a:effectRef>
+          <a:fontRef idx="minor">
+            <a:schemeClr val="tx1"/>
+          </a:fontRef>
+        </p:style>
+      </p:cxnSp>
       <p:pic>
         <p:nvPicPr>
           <p:cNvPr id="7" name="Picture 6">
@@ -5710,66 +5830,14 @@
         </p:blipFill>
         <p:spPr>
           <a:xfrm>
-            <a:off x="6286512" y="307731"/>
-            <a:ext cx="5522581" cy="4141935"/>
+            <a:off x="6507940" y="2426818"/>
+            <a:ext cx="5330183" cy="3997637"/>
           </a:xfrm>
           <a:prstGeom prst="rect">
             <a:avLst/>
           </a:prstGeom>
         </p:spPr>
       </p:pic>
-      <p:cxnSp>
-        <p:nvCxnSpPr>
-          <p:cNvPr id="16" name="Straight Connector 15">
-            <a:extLst>
-              <a:ext uri="{FF2B5EF4-FFF2-40B4-BE49-F238E27FC236}">
-                <a16:creationId xmlns:a16="http://schemas.microsoft.com/office/drawing/2014/main" id="{7E7C77BC-7138-40B1-A15B-20F57A494629}"/>
-              </a:ext>
-              <a:ext uri="{C183D7F6-B498-43B3-948B-1728B52AA6E4}">
-                <adec:decorative xmlns:adec="http://schemas.microsoft.com/office/drawing/2017/decorative" val="1"/>
-              </a:ext>
-            </a:extLst>
-          </p:cNvPr>
-          <p:cNvCxnSpPr>
-            <a:cxnSpLocks noGrp="1" noRot="1" noChangeAspect="1" noMove="1" noResize="1" noEditPoints="1" noAdjustHandles="1" noChangeArrowheads="1" noChangeShapeType="1"/>
-          </p:cNvCxnSpPr>
-          <p:nvPr>
-            <p:extLst>
-              <p:ext uri="{386F3935-93C4-4BCD-93E2-E3B085C9AB24}">
-                <p16:designElem xmlns:p16="http://schemas.microsoft.com/office/powerpoint/2015/main" val="1"/>
-              </p:ext>
-            </p:extLst>
-          </p:nvPr>
-        </p:nvCxnSpPr>
-        <p:spPr>
-          <a:xfrm>
-            <a:off x="2209800" y="5738691"/>
-            <a:ext cx="7772400" cy="0"/>
-          </a:xfrm>
-          <a:prstGeom prst="line">
-            <a:avLst/>
-          </a:prstGeom>
-          <a:ln w="22225">
-            <a:solidFill>
-              <a:srgbClr val="D9D9D9"/>
-            </a:solidFill>
-          </a:ln>
-        </p:spPr>
-        <p:style>
-          <a:lnRef idx="1">
-            <a:schemeClr val="accent1"/>
-          </a:lnRef>
-          <a:fillRef idx="0">
-            <a:schemeClr val="accent1"/>
-          </a:fillRef>
-          <a:effectRef idx="0">
-            <a:schemeClr val="accent1"/>
-          </a:effectRef>
-          <a:fontRef idx="minor">
-            <a:schemeClr val="tx1"/>
-          </a:fontRef>
-        </p:style>
-      </p:cxnSp>
     </p:spTree>
     <p:extLst>
       <p:ext uri="{BB962C8B-B14F-4D97-AF65-F5344CB8AC3E}">
@@ -5808,21 +5876,21 @@
           <a:chExt cx="0" cy="0"/>
         </a:xfrm>
       </p:grpSpPr>
-      <p:cxnSp>
-        <p:nvCxnSpPr>
-          <p:cNvPr id="12" name="Straight Connector 11">
-            <a:extLst>
-              <a:ext uri="{FF2B5EF4-FFF2-40B4-BE49-F238E27FC236}">
-                <a16:creationId xmlns:a16="http://schemas.microsoft.com/office/drawing/2014/main" id="{DB146403-F3D6-484B-B2ED-97F9565D0370}"/>
+      <p:sp>
+        <p:nvSpPr>
+          <p:cNvPr id="21" name="Rectangle 20">
+            <a:extLst>
+              <a:ext uri="{FF2B5EF4-FFF2-40B4-BE49-F238E27FC236}">
+                <a16:creationId xmlns:a16="http://schemas.microsoft.com/office/drawing/2014/main" id="{823AC064-BC96-4F32-8AE1-B2FD38754823}"/>
               </a:ext>
               <a:ext uri="{C183D7F6-B498-43B3-948B-1728B52AA6E4}">
                 <adec:decorative xmlns:adec="http://schemas.microsoft.com/office/drawing/2017/decorative" val="1"/>
               </a:ext>
             </a:extLst>
           </p:cNvPr>
-          <p:cNvCxnSpPr>
-            <a:cxnSpLocks noGrp="1" noRot="1" noChangeAspect="1" noMove="1" noResize="1" noEditPoints="1" noAdjustHandles="1" noChangeArrowheads="1" noChangeShapeType="1"/>
-          </p:cNvCxnSpPr>
+          <p:cNvSpPr>
+            <a:spLocks noGrp="1" noRot="1" noChangeAspect="1" noMove="1" noResize="1" noEditPoints="1" noAdjustHandles="1" noChangeArrowheads="1" noChangeShapeType="1" noTextEdit="1"/>
+          </p:cNvSpPr>
           <p:nvPr>
             <p:extLst>
               <p:ext uri="{386F3935-93C4-4BCD-93E2-E3B085C9AB24}">
@@ -5830,62 +5898,10 @@
               </p:ext>
             </p:extLst>
           </p:nvPr>
-        </p:nvCxnSpPr>
-        <p:spPr>
-          <a:xfrm>
-            <a:off x="6096000" y="477749"/>
-            <a:ext cx="0" cy="3657600"/>
-          </a:xfrm>
-          <a:prstGeom prst="line">
-            <a:avLst/>
-          </a:prstGeom>
-          <a:ln w="101600" cmpd="dbl">
-            <a:solidFill>
-              <a:srgbClr val="595959"/>
-            </a:solidFill>
-          </a:ln>
-        </p:spPr>
-        <p:style>
-          <a:lnRef idx="1">
-            <a:schemeClr val="accent1"/>
-          </a:lnRef>
-          <a:fillRef idx="0">
-            <a:schemeClr val="accent1"/>
-          </a:fillRef>
-          <a:effectRef idx="0">
-            <a:schemeClr val="accent1"/>
-          </a:effectRef>
-          <a:fontRef idx="minor">
-            <a:schemeClr val="tx1"/>
-          </a:fontRef>
-        </p:style>
-      </p:cxnSp>
-      <p:sp>
-        <p:nvSpPr>
-          <p:cNvPr id="14" name="Rectangle 13">
-            <a:extLst>
-              <a:ext uri="{FF2B5EF4-FFF2-40B4-BE49-F238E27FC236}">
-                <a16:creationId xmlns:a16="http://schemas.microsoft.com/office/drawing/2014/main" id="{823AC064-BC96-4F32-8AE1-B2FD38754823}"/>
-              </a:ext>
-              <a:ext uri="{C183D7F6-B498-43B3-948B-1728B52AA6E4}">
-                <adec:decorative xmlns:adec="http://schemas.microsoft.com/office/drawing/2017/decorative" val="1"/>
-              </a:ext>
-            </a:extLst>
-          </p:cNvPr>
-          <p:cNvSpPr>
-            <a:spLocks noGrp="1" noRot="1" noChangeAspect="1" noMove="1" noResize="1" noEditPoints="1" noAdjustHandles="1" noChangeArrowheads="1" noChangeShapeType="1" noTextEdit="1"/>
-          </p:cNvSpPr>
-          <p:nvPr>
-            <p:extLst>
-              <p:ext uri="{386F3935-93C4-4BCD-93E2-E3B085C9AB24}">
-                <p16:designElem xmlns:p16="http://schemas.microsoft.com/office/powerpoint/2015/main" val="1"/>
-              </p:ext>
-            </p:extLst>
-          </p:nvPr>
         </p:nvSpPr>
         <p:spPr bwMode="ltGray">
           <a:xfrm>
-            <a:off x="378068" y="4633546"/>
+            <a:off x="396882" y="280374"/>
             <a:ext cx="11438793" cy="1844256"/>
           </a:xfrm>
           <a:prstGeom prst="rect">
@@ -5943,7 +5959,7 @@
         </p:nvSpPr>
         <p:spPr>
           <a:xfrm>
-            <a:off x="527538" y="4756638"/>
+            <a:off x="546351" y="433545"/>
             <a:ext cx="11139854" cy="930447"/>
           </a:xfrm>
         </p:spPr>
@@ -5965,6 +5981,58 @@
           </a:p>
         </p:txBody>
       </p:sp>
+      <p:cxnSp>
+        <p:nvCxnSpPr>
+          <p:cNvPr id="23" name="Straight Connector 22">
+            <a:extLst>
+              <a:ext uri="{FF2B5EF4-FFF2-40B4-BE49-F238E27FC236}">
+                <a16:creationId xmlns:a16="http://schemas.microsoft.com/office/drawing/2014/main" id="{7E7C77BC-7138-40B1-A15B-20F57A494629}"/>
+              </a:ext>
+              <a:ext uri="{C183D7F6-B498-43B3-948B-1728B52AA6E4}">
+                <adec:decorative xmlns:adec="http://schemas.microsoft.com/office/drawing/2017/decorative" val="1"/>
+              </a:ext>
+            </a:extLst>
+          </p:cNvPr>
+          <p:cNvCxnSpPr>
+            <a:cxnSpLocks noGrp="1" noRot="1" noChangeAspect="1" noMove="1" noResize="1" noEditPoints="1" noAdjustHandles="1" noChangeArrowheads="1" noChangeShapeType="1"/>
+          </p:cNvCxnSpPr>
+          <p:nvPr>
+            <p:extLst>
+              <p:ext uri="{386F3935-93C4-4BCD-93E2-E3B085C9AB24}">
+                <p16:designElem xmlns:p16="http://schemas.microsoft.com/office/powerpoint/2015/main" val="1"/>
+              </p:ext>
+            </p:extLst>
+          </p:nvPr>
+        </p:nvCxnSpPr>
+        <p:spPr>
+          <a:xfrm>
+            <a:off x="2230078" y="1522292"/>
+            <a:ext cx="7772400" cy="0"/>
+          </a:xfrm>
+          <a:prstGeom prst="line">
+            <a:avLst/>
+          </a:prstGeom>
+          <a:ln w="22225">
+            <a:solidFill>
+              <a:srgbClr val="D9D9D9"/>
+            </a:solidFill>
+          </a:ln>
+        </p:spPr>
+        <p:style>
+          <a:lnRef idx="1">
+            <a:schemeClr val="accent1"/>
+          </a:lnRef>
+          <a:fillRef idx="0">
+            <a:schemeClr val="accent1"/>
+          </a:fillRef>
+          <a:effectRef idx="0">
+            <a:schemeClr val="accent1"/>
+          </a:effectRef>
+          <a:fontRef idx="minor">
+            <a:schemeClr val="tx1"/>
+          </a:fontRef>
+        </p:style>
+      </p:cxnSp>
       <p:pic>
         <p:nvPicPr>
           <p:cNvPr id="5" name="Content Placeholder 4">
@@ -5989,14 +6057,66 @@
         </p:blipFill>
         <p:spPr>
           <a:xfrm>
-            <a:off x="1" y="307731"/>
-            <a:ext cx="5713090" cy="4284817"/>
+            <a:off x="394434" y="2426818"/>
+            <a:ext cx="5330183" cy="3997637"/>
           </a:xfrm>
           <a:prstGeom prst="rect">
             <a:avLst/>
           </a:prstGeom>
         </p:spPr>
       </p:pic>
+      <p:cxnSp>
+        <p:nvCxnSpPr>
+          <p:cNvPr id="25" name="Straight Connector 24">
+            <a:extLst>
+              <a:ext uri="{FF2B5EF4-FFF2-40B4-BE49-F238E27FC236}">
+                <a16:creationId xmlns:a16="http://schemas.microsoft.com/office/drawing/2014/main" id="{DB146403-F3D6-484B-B2ED-97F9565D0370}"/>
+              </a:ext>
+              <a:ext uri="{C183D7F6-B498-43B3-948B-1728B52AA6E4}">
+                <adec:decorative xmlns:adec="http://schemas.microsoft.com/office/drawing/2017/decorative" val="1"/>
+              </a:ext>
+            </a:extLst>
+          </p:cNvPr>
+          <p:cNvCxnSpPr>
+            <a:cxnSpLocks noGrp="1" noRot="1" noChangeAspect="1" noMove="1" noResize="1" noEditPoints="1" noAdjustHandles="1" noChangeArrowheads="1" noChangeShapeType="1"/>
+          </p:cNvCxnSpPr>
+          <p:nvPr>
+            <p:extLst>
+              <p:ext uri="{386F3935-93C4-4BCD-93E2-E3B085C9AB24}">
+                <p16:designElem xmlns:p16="http://schemas.microsoft.com/office/powerpoint/2015/main" val="1"/>
+              </p:ext>
+            </p:extLst>
+          </p:nvPr>
+        </p:nvCxnSpPr>
+        <p:spPr>
+          <a:xfrm>
+            <a:off x="6116278" y="2596836"/>
+            <a:ext cx="0" cy="3657600"/>
+          </a:xfrm>
+          <a:prstGeom prst="line">
+            <a:avLst/>
+          </a:prstGeom>
+          <a:ln w="101600" cmpd="dbl">
+            <a:solidFill>
+              <a:srgbClr val="595959"/>
+            </a:solidFill>
+          </a:ln>
+        </p:spPr>
+        <p:style>
+          <a:lnRef idx="1">
+            <a:schemeClr val="accent1"/>
+          </a:lnRef>
+          <a:fillRef idx="0">
+            <a:schemeClr val="accent1"/>
+          </a:fillRef>
+          <a:effectRef idx="0">
+            <a:schemeClr val="accent1"/>
+          </a:effectRef>
+          <a:fontRef idx="minor">
+            <a:schemeClr val="tx1"/>
+          </a:fontRef>
+        </p:style>
+      </p:cxnSp>
       <p:pic>
         <p:nvPicPr>
           <p:cNvPr id="7" name="Picture 6">
@@ -6019,66 +6139,14 @@
         </p:blipFill>
         <p:spPr>
           <a:xfrm>
-            <a:off x="6096000" y="307731"/>
-            <a:ext cx="5713093" cy="4284819"/>
+            <a:off x="6507940" y="2426818"/>
+            <a:ext cx="5330183" cy="3997637"/>
           </a:xfrm>
           <a:prstGeom prst="rect">
             <a:avLst/>
           </a:prstGeom>
         </p:spPr>
       </p:pic>
-      <p:cxnSp>
-        <p:nvCxnSpPr>
-          <p:cNvPr id="16" name="Straight Connector 15">
-            <a:extLst>
-              <a:ext uri="{FF2B5EF4-FFF2-40B4-BE49-F238E27FC236}">
-                <a16:creationId xmlns:a16="http://schemas.microsoft.com/office/drawing/2014/main" id="{7E7C77BC-7138-40B1-A15B-20F57A494629}"/>
-              </a:ext>
-              <a:ext uri="{C183D7F6-B498-43B3-948B-1728B52AA6E4}">
-                <adec:decorative xmlns:adec="http://schemas.microsoft.com/office/drawing/2017/decorative" val="1"/>
-              </a:ext>
-            </a:extLst>
-          </p:cNvPr>
-          <p:cNvCxnSpPr>
-            <a:cxnSpLocks noGrp="1" noRot="1" noChangeAspect="1" noMove="1" noResize="1" noEditPoints="1" noAdjustHandles="1" noChangeArrowheads="1" noChangeShapeType="1"/>
-          </p:cNvCxnSpPr>
-          <p:nvPr>
-            <p:extLst>
-              <p:ext uri="{386F3935-93C4-4BCD-93E2-E3B085C9AB24}">
-                <p16:designElem xmlns:p16="http://schemas.microsoft.com/office/powerpoint/2015/main" val="1"/>
-              </p:ext>
-            </p:extLst>
-          </p:nvPr>
-        </p:nvCxnSpPr>
-        <p:spPr>
-          <a:xfrm>
-            <a:off x="2209800" y="5738691"/>
-            <a:ext cx="7772400" cy="0"/>
-          </a:xfrm>
-          <a:prstGeom prst="line">
-            <a:avLst/>
-          </a:prstGeom>
-          <a:ln w="22225">
-            <a:solidFill>
-              <a:srgbClr val="D9D9D9"/>
-            </a:solidFill>
-          </a:ln>
-        </p:spPr>
-        <p:style>
-          <a:lnRef idx="1">
-            <a:schemeClr val="accent1"/>
-          </a:lnRef>
-          <a:fillRef idx="0">
-            <a:schemeClr val="accent1"/>
-          </a:fillRef>
-          <a:effectRef idx="0">
-            <a:schemeClr val="accent1"/>
-          </a:effectRef>
-          <a:fontRef idx="minor">
-            <a:schemeClr val="tx1"/>
-          </a:fontRef>
-        </p:style>
-      </p:cxnSp>
     </p:spTree>
     <p:extLst>
       <p:ext uri="{BB962C8B-B14F-4D97-AF65-F5344CB8AC3E}">
@@ -6117,21 +6185,21 @@
           <a:chExt cx="0" cy="0"/>
         </a:xfrm>
       </p:grpSpPr>
-      <p:cxnSp>
-        <p:nvCxnSpPr>
-          <p:cNvPr id="12" name="Straight Connector 11">
-            <a:extLst>
-              <a:ext uri="{FF2B5EF4-FFF2-40B4-BE49-F238E27FC236}">
-                <a16:creationId xmlns:a16="http://schemas.microsoft.com/office/drawing/2014/main" id="{DB146403-F3D6-484B-B2ED-97F9565D0370}"/>
+      <p:sp>
+        <p:nvSpPr>
+          <p:cNvPr id="21" name="Rectangle 20">
+            <a:extLst>
+              <a:ext uri="{FF2B5EF4-FFF2-40B4-BE49-F238E27FC236}">
+                <a16:creationId xmlns:a16="http://schemas.microsoft.com/office/drawing/2014/main" id="{823AC064-BC96-4F32-8AE1-B2FD38754823}"/>
               </a:ext>
               <a:ext uri="{C183D7F6-B498-43B3-948B-1728B52AA6E4}">
                 <adec:decorative xmlns:adec="http://schemas.microsoft.com/office/drawing/2017/decorative" val="1"/>
               </a:ext>
             </a:extLst>
           </p:cNvPr>
-          <p:cNvCxnSpPr>
-            <a:cxnSpLocks noGrp="1" noRot="1" noChangeAspect="1" noMove="1" noResize="1" noEditPoints="1" noAdjustHandles="1" noChangeArrowheads="1" noChangeShapeType="1"/>
-          </p:cNvCxnSpPr>
+          <p:cNvSpPr>
+            <a:spLocks noGrp="1" noRot="1" noChangeAspect="1" noMove="1" noResize="1" noEditPoints="1" noAdjustHandles="1" noChangeArrowheads="1" noChangeShapeType="1" noTextEdit="1"/>
+          </p:cNvSpPr>
           <p:nvPr>
             <p:extLst>
               <p:ext uri="{386F3935-93C4-4BCD-93E2-E3B085C9AB24}">
@@ -6139,62 +6207,10 @@
               </p:ext>
             </p:extLst>
           </p:nvPr>
-        </p:nvCxnSpPr>
-        <p:spPr>
-          <a:xfrm>
-            <a:off x="6096000" y="477749"/>
-            <a:ext cx="0" cy="3657600"/>
-          </a:xfrm>
-          <a:prstGeom prst="line">
-            <a:avLst/>
-          </a:prstGeom>
-          <a:ln w="101600" cmpd="dbl">
-            <a:solidFill>
-              <a:srgbClr val="595959"/>
-            </a:solidFill>
-          </a:ln>
-        </p:spPr>
-        <p:style>
-          <a:lnRef idx="1">
-            <a:schemeClr val="accent1"/>
-          </a:lnRef>
-          <a:fillRef idx="0">
-            <a:schemeClr val="accent1"/>
-          </a:fillRef>
-          <a:effectRef idx="0">
-            <a:schemeClr val="accent1"/>
-          </a:effectRef>
-          <a:fontRef idx="minor">
-            <a:schemeClr val="tx1"/>
-          </a:fontRef>
-        </p:style>
-      </p:cxnSp>
-      <p:sp>
-        <p:nvSpPr>
-          <p:cNvPr id="14" name="Rectangle 13">
-            <a:extLst>
-              <a:ext uri="{FF2B5EF4-FFF2-40B4-BE49-F238E27FC236}">
-                <a16:creationId xmlns:a16="http://schemas.microsoft.com/office/drawing/2014/main" id="{823AC064-BC96-4F32-8AE1-B2FD38754823}"/>
-              </a:ext>
-              <a:ext uri="{C183D7F6-B498-43B3-948B-1728B52AA6E4}">
-                <adec:decorative xmlns:adec="http://schemas.microsoft.com/office/drawing/2017/decorative" val="1"/>
-              </a:ext>
-            </a:extLst>
-          </p:cNvPr>
-          <p:cNvSpPr>
-            <a:spLocks noGrp="1" noRot="1" noChangeAspect="1" noMove="1" noResize="1" noEditPoints="1" noAdjustHandles="1" noChangeArrowheads="1" noChangeShapeType="1" noTextEdit="1"/>
-          </p:cNvSpPr>
-          <p:nvPr>
-            <p:extLst>
-              <p:ext uri="{386F3935-93C4-4BCD-93E2-E3B085C9AB24}">
-                <p16:designElem xmlns:p16="http://schemas.microsoft.com/office/powerpoint/2015/main" val="1"/>
-              </p:ext>
-            </p:extLst>
-          </p:nvPr>
         </p:nvSpPr>
         <p:spPr bwMode="ltGray">
           <a:xfrm>
-            <a:off x="378068" y="4633546"/>
+            <a:off x="396882" y="280374"/>
             <a:ext cx="11438793" cy="1844256"/>
           </a:xfrm>
           <a:prstGeom prst="rect">
@@ -6252,7 +6268,7 @@
         </p:nvSpPr>
         <p:spPr>
           <a:xfrm>
-            <a:off x="527538" y="4756638"/>
+            <a:off x="546351" y="433545"/>
             <a:ext cx="11139854" cy="930447"/>
           </a:xfrm>
         </p:spPr>
@@ -6274,6 +6290,58 @@
           </a:p>
         </p:txBody>
       </p:sp>
+      <p:cxnSp>
+        <p:nvCxnSpPr>
+          <p:cNvPr id="23" name="Straight Connector 22">
+            <a:extLst>
+              <a:ext uri="{FF2B5EF4-FFF2-40B4-BE49-F238E27FC236}">
+                <a16:creationId xmlns:a16="http://schemas.microsoft.com/office/drawing/2014/main" id="{7E7C77BC-7138-40B1-A15B-20F57A494629}"/>
+              </a:ext>
+              <a:ext uri="{C183D7F6-B498-43B3-948B-1728B52AA6E4}">
+                <adec:decorative xmlns:adec="http://schemas.microsoft.com/office/drawing/2017/decorative" val="1"/>
+              </a:ext>
+            </a:extLst>
+          </p:cNvPr>
+          <p:cNvCxnSpPr>
+            <a:cxnSpLocks noGrp="1" noRot="1" noChangeAspect="1" noMove="1" noResize="1" noEditPoints="1" noAdjustHandles="1" noChangeArrowheads="1" noChangeShapeType="1"/>
+          </p:cNvCxnSpPr>
+          <p:nvPr>
+            <p:extLst>
+              <p:ext uri="{386F3935-93C4-4BCD-93E2-E3B085C9AB24}">
+                <p16:designElem xmlns:p16="http://schemas.microsoft.com/office/powerpoint/2015/main" val="1"/>
+              </p:ext>
+            </p:extLst>
+          </p:nvPr>
+        </p:nvCxnSpPr>
+        <p:spPr>
+          <a:xfrm>
+            <a:off x="2230078" y="1522292"/>
+            <a:ext cx="7772400" cy="0"/>
+          </a:xfrm>
+          <a:prstGeom prst="line">
+            <a:avLst/>
+          </a:prstGeom>
+          <a:ln w="22225">
+            <a:solidFill>
+              <a:srgbClr val="D9D9D9"/>
+            </a:solidFill>
+          </a:ln>
+        </p:spPr>
+        <p:style>
+          <a:lnRef idx="1">
+            <a:schemeClr val="accent1"/>
+          </a:lnRef>
+          <a:fillRef idx="0">
+            <a:schemeClr val="accent1"/>
+          </a:fillRef>
+          <a:effectRef idx="0">
+            <a:schemeClr val="accent1"/>
+          </a:effectRef>
+          <a:fontRef idx="minor">
+            <a:schemeClr val="tx1"/>
+          </a:fontRef>
+        </p:style>
+      </p:cxnSp>
       <p:pic>
         <p:nvPicPr>
           <p:cNvPr id="7" name="Picture 6">
@@ -6296,7 +6364,7 @@
         </p:blipFill>
         <p:spPr>
           <a:xfrm>
-            <a:off x="382907" y="307731"/>
+            <a:off x="394434" y="2426818"/>
             <a:ext cx="5330183" cy="3997637"/>
           </a:xfrm>
           <a:prstGeom prst="rect">
@@ -6304,6 +6372,58 @@
           </a:prstGeom>
         </p:spPr>
       </p:pic>
+      <p:cxnSp>
+        <p:nvCxnSpPr>
+          <p:cNvPr id="25" name="Straight Connector 24">
+            <a:extLst>
+              <a:ext uri="{FF2B5EF4-FFF2-40B4-BE49-F238E27FC236}">
+                <a16:creationId xmlns:a16="http://schemas.microsoft.com/office/drawing/2014/main" id="{DB146403-F3D6-484B-B2ED-97F9565D0370}"/>
+              </a:ext>
+              <a:ext uri="{C183D7F6-B498-43B3-948B-1728B52AA6E4}">
+                <adec:decorative xmlns:adec="http://schemas.microsoft.com/office/drawing/2017/decorative" val="1"/>
+              </a:ext>
+            </a:extLst>
+          </p:cNvPr>
+          <p:cNvCxnSpPr>
+            <a:cxnSpLocks noGrp="1" noRot="1" noChangeAspect="1" noMove="1" noResize="1" noEditPoints="1" noAdjustHandles="1" noChangeArrowheads="1" noChangeShapeType="1"/>
+          </p:cNvCxnSpPr>
+          <p:nvPr>
+            <p:extLst>
+              <p:ext uri="{386F3935-93C4-4BCD-93E2-E3B085C9AB24}">
+                <p16:designElem xmlns:p16="http://schemas.microsoft.com/office/powerpoint/2015/main" val="1"/>
+              </p:ext>
+            </p:extLst>
+          </p:nvPr>
+        </p:nvCxnSpPr>
+        <p:spPr>
+          <a:xfrm>
+            <a:off x="6116278" y="2596836"/>
+            <a:ext cx="0" cy="3657600"/>
+          </a:xfrm>
+          <a:prstGeom prst="line">
+            <a:avLst/>
+          </a:prstGeom>
+          <a:ln w="101600" cmpd="dbl">
+            <a:solidFill>
+              <a:srgbClr val="595959"/>
+            </a:solidFill>
+          </a:ln>
+        </p:spPr>
+        <p:style>
+          <a:lnRef idx="1">
+            <a:schemeClr val="accent1"/>
+          </a:lnRef>
+          <a:fillRef idx="0">
+            <a:schemeClr val="accent1"/>
+          </a:fillRef>
+          <a:effectRef idx="0">
+            <a:schemeClr val="accent1"/>
+          </a:effectRef>
+          <a:fontRef idx="minor">
+            <a:schemeClr val="tx1"/>
+          </a:fontRef>
+        </p:style>
+      </p:cxnSp>
       <p:pic>
         <p:nvPicPr>
           <p:cNvPr id="5" name="Content Placeholder 4">
@@ -6328,7 +6448,7 @@
         </p:blipFill>
         <p:spPr>
           <a:xfrm>
-            <a:off x="6478910" y="307731"/>
+            <a:off x="6507940" y="2426818"/>
             <a:ext cx="5330183" cy="3997637"/>
           </a:xfrm>
           <a:prstGeom prst="rect">
@@ -6336,58 +6456,6 @@
           </a:prstGeom>
         </p:spPr>
       </p:pic>
-      <p:cxnSp>
-        <p:nvCxnSpPr>
-          <p:cNvPr id="16" name="Straight Connector 15">
-            <a:extLst>
-              <a:ext uri="{FF2B5EF4-FFF2-40B4-BE49-F238E27FC236}">
-                <a16:creationId xmlns:a16="http://schemas.microsoft.com/office/drawing/2014/main" id="{7E7C77BC-7138-40B1-A15B-20F57A494629}"/>
-              </a:ext>
-              <a:ext uri="{C183D7F6-B498-43B3-948B-1728B52AA6E4}">
-                <adec:decorative xmlns:adec="http://schemas.microsoft.com/office/drawing/2017/decorative" val="1"/>
-              </a:ext>
-            </a:extLst>
-          </p:cNvPr>
-          <p:cNvCxnSpPr>
-            <a:cxnSpLocks noGrp="1" noRot="1" noChangeAspect="1" noMove="1" noResize="1" noEditPoints="1" noAdjustHandles="1" noChangeArrowheads="1" noChangeShapeType="1"/>
-          </p:cNvCxnSpPr>
-          <p:nvPr>
-            <p:extLst>
-              <p:ext uri="{386F3935-93C4-4BCD-93E2-E3B085C9AB24}">
-                <p16:designElem xmlns:p16="http://schemas.microsoft.com/office/powerpoint/2015/main" val="1"/>
-              </p:ext>
-            </p:extLst>
-          </p:nvPr>
-        </p:nvCxnSpPr>
-        <p:spPr>
-          <a:xfrm>
-            <a:off x="2209800" y="5738691"/>
-            <a:ext cx="7772400" cy="0"/>
-          </a:xfrm>
-          <a:prstGeom prst="line">
-            <a:avLst/>
-          </a:prstGeom>
-          <a:ln w="22225">
-            <a:solidFill>
-              <a:srgbClr val="D9D9D9"/>
-            </a:solidFill>
-          </a:ln>
-        </p:spPr>
-        <p:style>
-          <a:lnRef idx="1">
-            <a:schemeClr val="accent1"/>
-          </a:lnRef>
-          <a:fillRef idx="0">
-            <a:schemeClr val="accent1"/>
-          </a:fillRef>
-          <a:effectRef idx="0">
-            <a:schemeClr val="accent1"/>
-          </a:effectRef>
-          <a:fontRef idx="minor">
-            <a:schemeClr val="tx1"/>
-          </a:fontRef>
-        </p:style>
-      </p:cxnSp>
     </p:spTree>
     <p:extLst>
       <p:ext uri="{BB962C8B-B14F-4D97-AF65-F5344CB8AC3E}">

</xml_diff>